<commit_message>
Fiz umas coisas no power point
</commit_message>
<xml_diff>
--- a/Apresentação BD.pptx
+++ b/Apresentação BD.pptx
@@ -5,10 +5,17 @@
     <p:sldMasterId id="2147483648" r:id="rId1"/>
   </p:sldMasterIdLst>
   <p:notesMasterIdLst>
-    <p:notesMasterId r:id="rId3"/>
+    <p:notesMasterId r:id="rId10"/>
   </p:notesMasterIdLst>
   <p:sldIdLst>
     <p:sldId id="256" r:id="rId2"/>
+    <p:sldId id="258" r:id="rId3"/>
+    <p:sldId id="259" r:id="rId4"/>
+    <p:sldId id="260" r:id="rId5"/>
+    <p:sldId id="261" r:id="rId6"/>
+    <p:sldId id="262" r:id="rId7"/>
+    <p:sldId id="263" r:id="rId8"/>
+    <p:sldId id="264" r:id="rId9"/>
   </p:sldIdLst>
   <p:sldSz cx="12192000" cy="6858000"/>
   <p:notesSz cx="6858000" cy="9144000"/>
@@ -107,6 +114,11 @@
       </a:defRPr>
     </a:lvl9pPr>
   </p:defaultTextStyle>
+  <p:extLst>
+    <p:ext uri="{EFAFB233-063F-42B5-8137-9DF3F51BA10A}">
+      <p15:sldGuideLst xmlns:p15="http://schemas.microsoft.com/office/powerpoint/2012/main"/>
+    </p:ext>
+  </p:extLst>
 </p:presentation>
 </file>
 
@@ -192,7 +204,7 @@
           <a:p>
             <a:fld id="{0A538BEC-E331-4F1A-B277-A6186320AEFE}" type="datetimeFigureOut">
               <a:rPr lang="pt-PT" smtClean="0"/>
-              <a:t>12/01/2019</a:t>
+              <a:t>14/01/2019</a:t>
             </a:fld>
             <a:endParaRPr lang="pt-PT"/>
           </a:p>
@@ -591,7 +603,7 @@
           <a:p>
             <a:fld id="{E011CE98-2713-45F9-A806-008D9A8C3646}" type="datetimeFigureOut">
               <a:rPr lang="pt-PT" smtClean="0"/>
-              <a:t>12/01/2019</a:t>
+              <a:t>14/01/2019</a:t>
             </a:fld>
             <a:endParaRPr lang="pt-PT"/>
           </a:p>
@@ -761,7 +773,7 @@
           <a:p>
             <a:fld id="{E011CE98-2713-45F9-A806-008D9A8C3646}" type="datetimeFigureOut">
               <a:rPr lang="pt-PT" smtClean="0"/>
-              <a:t>12/01/2019</a:t>
+              <a:t>14/01/2019</a:t>
             </a:fld>
             <a:endParaRPr lang="pt-PT"/>
           </a:p>
@@ -941,7 +953,7 @@
           <a:p>
             <a:fld id="{E011CE98-2713-45F9-A806-008D9A8C3646}" type="datetimeFigureOut">
               <a:rPr lang="pt-PT" smtClean="0"/>
-              <a:t>12/01/2019</a:t>
+              <a:t>14/01/2019</a:t>
             </a:fld>
             <a:endParaRPr lang="pt-PT"/>
           </a:p>
@@ -1111,7 +1123,7 @@
           <a:p>
             <a:fld id="{E011CE98-2713-45F9-A806-008D9A8C3646}" type="datetimeFigureOut">
               <a:rPr lang="pt-PT" smtClean="0"/>
-              <a:t>12/01/2019</a:t>
+              <a:t>14/01/2019</a:t>
             </a:fld>
             <a:endParaRPr lang="pt-PT"/>
           </a:p>
@@ -1357,7 +1369,7 @@
           <a:p>
             <a:fld id="{E011CE98-2713-45F9-A806-008D9A8C3646}" type="datetimeFigureOut">
               <a:rPr lang="pt-PT" smtClean="0"/>
-              <a:t>12/01/2019</a:t>
+              <a:t>14/01/2019</a:t>
             </a:fld>
             <a:endParaRPr lang="pt-PT"/>
           </a:p>
@@ -1589,7 +1601,7 @@
           <a:p>
             <a:fld id="{E011CE98-2713-45F9-A806-008D9A8C3646}" type="datetimeFigureOut">
               <a:rPr lang="pt-PT" smtClean="0"/>
-              <a:t>12/01/2019</a:t>
+              <a:t>14/01/2019</a:t>
             </a:fld>
             <a:endParaRPr lang="pt-PT"/>
           </a:p>
@@ -1956,7 +1968,7 @@
           <a:p>
             <a:fld id="{E011CE98-2713-45F9-A806-008D9A8C3646}" type="datetimeFigureOut">
               <a:rPr lang="pt-PT" smtClean="0"/>
-              <a:t>12/01/2019</a:t>
+              <a:t>14/01/2019</a:t>
             </a:fld>
             <a:endParaRPr lang="pt-PT"/>
           </a:p>
@@ -2074,7 +2086,7 @@
           <a:p>
             <a:fld id="{E011CE98-2713-45F9-A806-008D9A8C3646}" type="datetimeFigureOut">
               <a:rPr lang="pt-PT" smtClean="0"/>
-              <a:t>12/01/2019</a:t>
+              <a:t>14/01/2019</a:t>
             </a:fld>
             <a:endParaRPr lang="pt-PT"/>
           </a:p>
@@ -2169,7 +2181,7 @@
           <a:p>
             <a:fld id="{E011CE98-2713-45F9-A806-008D9A8C3646}" type="datetimeFigureOut">
               <a:rPr lang="pt-PT" smtClean="0"/>
-              <a:t>12/01/2019</a:t>
+              <a:t>14/01/2019</a:t>
             </a:fld>
             <a:endParaRPr lang="pt-PT"/>
           </a:p>
@@ -2446,7 +2458,7 @@
           <a:p>
             <a:fld id="{E011CE98-2713-45F9-A806-008D9A8C3646}" type="datetimeFigureOut">
               <a:rPr lang="pt-PT" smtClean="0"/>
-              <a:t>12/01/2019</a:t>
+              <a:t>14/01/2019</a:t>
             </a:fld>
             <a:endParaRPr lang="pt-PT"/>
           </a:p>
@@ -2699,7 +2711,7 @@
           <a:p>
             <a:fld id="{E011CE98-2713-45F9-A806-008D9A8C3646}" type="datetimeFigureOut">
               <a:rPr lang="pt-PT" smtClean="0"/>
-              <a:t>12/01/2019</a:t>
+              <a:t>14/01/2019</a:t>
             </a:fld>
             <a:endParaRPr lang="pt-PT"/>
           </a:p>
@@ -2912,7 +2924,7 @@
           <a:p>
             <a:fld id="{E011CE98-2713-45F9-A806-008D9A8C3646}" type="datetimeFigureOut">
               <a:rPr lang="pt-PT" smtClean="0"/>
-              <a:t>12/01/2019</a:t>
+              <a:t>14/01/2019</a:t>
             </a:fld>
             <a:endParaRPr lang="pt-PT"/>
           </a:p>
@@ -3488,6 +3500,1001 @@
       </p:par>
     </p:tnLst>
   </p:timing>
+</p:sld>
+</file>
+
+<file path=ppt/slides/slide2.xml><?xml version="1.0" encoding="utf-8"?>
+<p:sld xmlns:a="http://schemas.openxmlformats.org/drawingml/2006/main" xmlns:r="http://schemas.openxmlformats.org/officeDocument/2006/relationships" xmlns:p="http://schemas.openxmlformats.org/presentationml/2006/main">
+  <p:cSld>
+    <p:spTree>
+      <p:nvGrpSpPr>
+        <p:cNvPr id="1" name=""/>
+        <p:cNvGrpSpPr/>
+        <p:nvPr/>
+      </p:nvGrpSpPr>
+      <p:grpSpPr>
+        <a:xfrm>
+          <a:off x="0" y="0"/>
+          <a:ext cx="0" cy="0"/>
+          <a:chOff x="0" y="0"/>
+          <a:chExt cx="0" cy="0"/>
+        </a:xfrm>
+      </p:grpSpPr>
+      <p:sp>
+        <p:nvSpPr>
+          <p:cNvPr id="2" name="Título 1"/>
+          <p:cNvSpPr>
+            <a:spLocks noGrp="1"/>
+          </p:cNvSpPr>
+          <p:nvPr>
+            <p:ph type="title"/>
+          </p:nvPr>
+        </p:nvSpPr>
+        <p:spPr/>
+        <p:txBody>
+          <a:bodyPr/>
+          <a:lstStyle/>
+          <a:p>
+            <a:r>
+              <a:rPr lang="pt-PT" dirty="0" smtClean="0"/>
+              <a:t>Introdução</a:t>
+            </a:r>
+            <a:endParaRPr lang="pt-PT" dirty="0"/>
+          </a:p>
+        </p:txBody>
+      </p:sp>
+      <p:sp>
+        <p:nvSpPr>
+          <p:cNvPr id="3" name="Marcador de Posição de Conteúdo 2"/>
+          <p:cNvSpPr>
+            <a:spLocks noGrp="1"/>
+          </p:cNvSpPr>
+          <p:nvPr>
+            <p:ph idx="1"/>
+          </p:nvPr>
+        </p:nvSpPr>
+        <p:spPr/>
+        <p:txBody>
+          <a:bodyPr/>
+          <a:lstStyle/>
+          <a:p>
+            <a:r>
+              <a:rPr lang="pt-PT" dirty="0" smtClean="0"/>
+              <a:t>O tema do trabalho é “Mercado de Compra e Vendas Online”</a:t>
+            </a:r>
+          </a:p>
+          <a:p>
+            <a:r>
+              <a:rPr lang="pt-PT" dirty="0" smtClean="0"/>
+              <a:t>O site “Amazon” serviu de inspiração para o trabalho, já que é uma das maiores empresas do mundo</a:t>
+            </a:r>
+          </a:p>
+          <a:p>
+            <a:r>
+              <a:rPr lang="pt-PT" dirty="0" smtClean="0"/>
+              <a:t>Objetivo principal é o desenvolvimento e gestão de uma base de dados</a:t>
+            </a:r>
+          </a:p>
+          <a:p>
+            <a:r>
+              <a:rPr lang="pt-PT" dirty="0" smtClean="0"/>
+              <a:t>A base de dados permite múltiplo acesso, flexibilidade, resposta rápida aos pedidos de acesso e integridade da informação, apesar do seu custo elevado.</a:t>
+            </a:r>
+          </a:p>
+          <a:p>
+            <a:endParaRPr lang="pt-PT" dirty="0"/>
+          </a:p>
+        </p:txBody>
+      </p:sp>
+    </p:spTree>
+    <p:extLst>
+      <p:ext uri="{BB962C8B-B14F-4D97-AF65-F5344CB8AC3E}">
+        <p14:creationId xmlns:p14="http://schemas.microsoft.com/office/powerpoint/2010/main" val="571312949"/>
+      </p:ext>
+    </p:extLst>
+  </p:cSld>
+  <p:clrMapOvr>
+    <a:masterClrMapping/>
+  </p:clrMapOvr>
+</p:sld>
+</file>
+
+<file path=ppt/slides/slide3.xml><?xml version="1.0" encoding="utf-8"?>
+<p:sld xmlns:a="http://schemas.openxmlformats.org/drawingml/2006/main" xmlns:r="http://schemas.openxmlformats.org/officeDocument/2006/relationships" xmlns:p="http://schemas.openxmlformats.org/presentationml/2006/main">
+  <p:cSld>
+    <p:spTree>
+      <p:nvGrpSpPr>
+        <p:cNvPr id="1" name=""/>
+        <p:cNvGrpSpPr/>
+        <p:nvPr/>
+      </p:nvGrpSpPr>
+      <p:grpSpPr>
+        <a:xfrm>
+          <a:off x="0" y="0"/>
+          <a:ext cx="0" cy="0"/>
+          <a:chOff x="0" y="0"/>
+          <a:chExt cx="0" cy="0"/>
+        </a:xfrm>
+      </p:grpSpPr>
+      <p:sp>
+        <p:nvSpPr>
+          <p:cNvPr id="2" name="Título 1"/>
+          <p:cNvSpPr>
+            <a:spLocks noGrp="1"/>
+          </p:cNvSpPr>
+          <p:nvPr>
+            <p:ph type="title"/>
+          </p:nvPr>
+        </p:nvSpPr>
+        <p:spPr/>
+        <p:txBody>
+          <a:bodyPr/>
+          <a:lstStyle/>
+          <a:p>
+            <a:r>
+              <a:rPr lang="pt-PT" dirty="0" smtClean="0"/>
+              <a:t>Levantamento e análise de requisitos</a:t>
+            </a:r>
+            <a:endParaRPr lang="pt-PT" dirty="0"/>
+          </a:p>
+        </p:txBody>
+      </p:sp>
+      <p:sp>
+        <p:nvSpPr>
+          <p:cNvPr id="3" name="Marcador de Posição de Conteúdo 2"/>
+          <p:cNvSpPr>
+            <a:spLocks noGrp="1"/>
+          </p:cNvSpPr>
+          <p:nvPr>
+            <p:ph idx="1"/>
+          </p:nvPr>
+        </p:nvSpPr>
+        <p:spPr/>
+        <p:txBody>
+          <a:bodyPr/>
+          <a:lstStyle/>
+          <a:p>
+            <a:r>
+              <a:rPr lang="pt-PT" dirty="0" smtClean="0"/>
+              <a:t>Métodos de levantamento e análise de requisitos adotados</a:t>
+            </a:r>
+          </a:p>
+          <a:p>
+            <a:pPr marL="0" indent="0">
+              <a:buNone/>
+            </a:pPr>
+            <a:r>
+              <a:rPr lang="pt-PT" sz="1800" dirty="0" smtClean="0"/>
+              <a:t>Para encontrar os requisitos foi seguida uma abordagem centralizada. Foram identificados dois tipos de utilizadores na base de dados.</a:t>
+            </a:r>
+          </a:p>
+          <a:p>
+            <a:r>
+              <a:rPr lang="pt-PT" dirty="0" smtClean="0"/>
+              <a:t>Requisitos Levantados</a:t>
+            </a:r>
+            <a:endParaRPr lang="pt-PT" sz="1800" dirty="0" smtClean="0"/>
+          </a:p>
+          <a:p>
+            <a:pPr lvl="1"/>
+            <a:r>
+              <a:rPr lang="pt-PT" dirty="0" smtClean="0"/>
+              <a:t>Requisitos de Descrição</a:t>
+            </a:r>
+          </a:p>
+          <a:p>
+            <a:pPr marL="457200" lvl="1" indent="0">
+              <a:buNone/>
+            </a:pPr>
+            <a:r>
+              <a:rPr lang="pt-PT" sz="1800" dirty="0" smtClean="0"/>
+              <a:t>Caraterísticas de cada entidade</a:t>
+            </a:r>
+          </a:p>
+          <a:p>
+            <a:pPr lvl="1"/>
+            <a:r>
+              <a:rPr lang="pt-PT" dirty="0" smtClean="0"/>
+              <a:t>Requisitos de exploração</a:t>
+            </a:r>
+          </a:p>
+          <a:p>
+            <a:pPr marL="457200" lvl="1" indent="0">
+              <a:buNone/>
+            </a:pPr>
+            <a:r>
+              <a:rPr lang="pt-PT" sz="1800" dirty="0" smtClean="0"/>
+              <a:t>Permissão de cada utilizador para pesquisar no sistema</a:t>
+            </a:r>
+          </a:p>
+          <a:p>
+            <a:pPr lvl="1"/>
+            <a:r>
+              <a:rPr lang="pt-PT" dirty="0" smtClean="0"/>
+              <a:t>Requisitos de Controlo</a:t>
+            </a:r>
+          </a:p>
+          <a:p>
+            <a:pPr marL="457200" lvl="1" indent="0">
+              <a:buNone/>
+            </a:pPr>
+            <a:r>
+              <a:rPr lang="pt-PT" sz="1800" dirty="0" smtClean="0"/>
+              <a:t>Permissão de cada utilizador para editar informação da base de dados</a:t>
+            </a:r>
+            <a:endParaRPr lang="pt-PT" sz="1800" dirty="0"/>
+          </a:p>
+        </p:txBody>
+      </p:sp>
+    </p:spTree>
+    <p:extLst>
+      <p:ext uri="{BB962C8B-B14F-4D97-AF65-F5344CB8AC3E}">
+        <p14:creationId xmlns:p14="http://schemas.microsoft.com/office/powerpoint/2010/main" val="2597304738"/>
+      </p:ext>
+    </p:extLst>
+  </p:cSld>
+  <p:clrMapOvr>
+    <a:masterClrMapping/>
+  </p:clrMapOvr>
+</p:sld>
+</file>
+
+<file path=ppt/slides/slide4.xml><?xml version="1.0" encoding="utf-8"?>
+<p:sld xmlns:a="http://schemas.openxmlformats.org/drawingml/2006/main" xmlns:r="http://schemas.openxmlformats.org/officeDocument/2006/relationships" xmlns:p="http://schemas.openxmlformats.org/presentationml/2006/main">
+  <p:cSld>
+    <p:spTree>
+      <p:nvGrpSpPr>
+        <p:cNvPr id="1" name=""/>
+        <p:cNvGrpSpPr/>
+        <p:nvPr/>
+      </p:nvGrpSpPr>
+      <p:grpSpPr>
+        <a:xfrm>
+          <a:off x="0" y="0"/>
+          <a:ext cx="0" cy="0"/>
+          <a:chOff x="0" y="0"/>
+          <a:chExt cx="0" cy="0"/>
+        </a:xfrm>
+      </p:grpSpPr>
+      <p:sp>
+        <p:nvSpPr>
+          <p:cNvPr id="2" name="Título 1"/>
+          <p:cNvSpPr>
+            <a:spLocks noGrp="1"/>
+          </p:cNvSpPr>
+          <p:nvPr>
+            <p:ph type="title"/>
+          </p:nvPr>
+        </p:nvSpPr>
+        <p:spPr/>
+        <p:txBody>
+          <a:bodyPr/>
+          <a:lstStyle/>
+          <a:p>
+            <a:r>
+              <a:rPr lang="pt-PT" dirty="0" smtClean="0"/>
+              <a:t>Esquema Concetual</a:t>
+            </a:r>
+            <a:endParaRPr lang="pt-PT" dirty="0"/>
+          </a:p>
+        </p:txBody>
+      </p:sp>
+      <p:pic>
+        <p:nvPicPr>
+          <p:cNvPr id="4" name="Marcador de Posição de Conteúdo 3"/>
+          <p:cNvPicPr>
+            <a:picLocks noGrp="1"/>
+          </p:cNvPicPr>
+          <p:nvPr>
+            <p:ph idx="1"/>
+          </p:nvPr>
+        </p:nvPicPr>
+        <p:blipFill>
+          <a:blip r:embed="rId2">
+            <a:extLst>
+              <a:ext uri="{28A0092B-C50C-407E-A947-70E740481C1C}">
+                <a14:useLocalDpi xmlns:a14="http://schemas.microsoft.com/office/drawing/2010/main" val="0"/>
+              </a:ext>
+            </a:extLst>
+          </a:blip>
+          <a:stretch>
+            <a:fillRect/>
+          </a:stretch>
+        </p:blipFill>
+        <p:spPr>
+          <a:xfrm>
+            <a:off x="6096000" y="1690688"/>
+            <a:ext cx="5623267" cy="3483478"/>
+          </a:xfrm>
+          <a:prstGeom prst="rect">
+            <a:avLst/>
+          </a:prstGeom>
+        </p:spPr>
+      </p:pic>
+      <p:sp>
+        <p:nvSpPr>
+          <p:cNvPr id="5" name="CaixaDeTexto 4"/>
+          <p:cNvSpPr txBox="1"/>
+          <p:nvPr/>
+        </p:nvSpPr>
+        <p:spPr>
+          <a:xfrm>
+            <a:off x="202580" y="1828799"/>
+            <a:ext cx="5361878" cy="2031325"/>
+          </a:xfrm>
+          <a:prstGeom prst="rect">
+            <a:avLst/>
+          </a:prstGeom>
+          <a:noFill/>
+        </p:spPr>
+        <p:txBody>
+          <a:bodyPr wrap="square" rtlCol="0">
+            <a:spAutoFit/>
+          </a:bodyPr>
+          <a:lstStyle/>
+          <a:p>
+            <a:pPr marL="285750" indent="-285750">
+              <a:buFont typeface="Arial" panose="020B0604020202020204" pitchFamily="34" charset="0"/>
+              <a:buChar char="•"/>
+            </a:pPr>
+            <a:r>
+              <a:rPr lang="pt-PT" dirty="0" smtClean="0"/>
+              <a:t>Abordagem de modelação realizada</a:t>
+            </a:r>
+          </a:p>
+          <a:p>
+            <a:pPr marL="285750" indent="-285750">
+              <a:buFont typeface="Arial" panose="020B0604020202020204" pitchFamily="34" charset="0"/>
+              <a:buChar char="•"/>
+            </a:pPr>
+            <a:r>
+              <a:rPr lang="pt-PT" dirty="0" smtClean="0"/>
+              <a:t>Identificação e caraterização de entidades</a:t>
+            </a:r>
+          </a:p>
+          <a:p>
+            <a:pPr marL="285750" indent="-285750">
+              <a:buFont typeface="Arial" panose="020B0604020202020204" pitchFamily="34" charset="0"/>
+              <a:buChar char="•"/>
+            </a:pPr>
+            <a:r>
+              <a:rPr lang="pt-PT" dirty="0" smtClean="0"/>
+              <a:t>Identificação e caraterização de relacionamentos</a:t>
+            </a:r>
+          </a:p>
+          <a:p>
+            <a:pPr marL="285750" indent="-285750">
+              <a:buFont typeface="Arial" panose="020B0604020202020204" pitchFamily="34" charset="0"/>
+              <a:buChar char="•"/>
+            </a:pPr>
+            <a:r>
+              <a:rPr lang="pt-PT" dirty="0" smtClean="0"/>
+              <a:t>Identificação das Associações dos atributos</a:t>
+            </a:r>
+          </a:p>
+          <a:p>
+            <a:pPr marL="285750" indent="-285750">
+              <a:buFont typeface="Arial" panose="020B0604020202020204" pitchFamily="34" charset="0"/>
+              <a:buChar char="•"/>
+            </a:pPr>
+            <a:r>
+              <a:rPr lang="pt-PT" dirty="0" smtClean="0"/>
+              <a:t>Detalhe ou generalização de entidades</a:t>
+            </a:r>
+          </a:p>
+          <a:p>
+            <a:pPr marL="285750" indent="-285750">
+              <a:buFont typeface="Arial" panose="020B0604020202020204" pitchFamily="34" charset="0"/>
+              <a:buChar char="•"/>
+            </a:pPr>
+            <a:r>
+              <a:rPr lang="pt-PT" dirty="0" smtClean="0"/>
+              <a:t>Apresentação do esquema concetual</a:t>
+            </a:r>
+          </a:p>
+          <a:p>
+            <a:pPr marL="285750" indent="-285750">
+              <a:buFont typeface="Arial" panose="020B0604020202020204" pitchFamily="34" charset="0"/>
+              <a:buChar char="•"/>
+            </a:pPr>
+            <a:r>
+              <a:rPr lang="pt-PT" dirty="0" smtClean="0"/>
+              <a:t>Validação do esquema com o cliente</a:t>
+            </a:r>
+            <a:endParaRPr lang="pt-PT" dirty="0"/>
+          </a:p>
+        </p:txBody>
+      </p:sp>
+    </p:spTree>
+    <p:extLst>
+      <p:ext uri="{BB962C8B-B14F-4D97-AF65-F5344CB8AC3E}">
+        <p14:creationId xmlns:p14="http://schemas.microsoft.com/office/powerpoint/2010/main" val="2316649488"/>
+      </p:ext>
+    </p:extLst>
+  </p:cSld>
+  <p:clrMapOvr>
+    <a:masterClrMapping/>
+  </p:clrMapOvr>
+</p:sld>
+</file>
+
+<file path=ppt/slides/slide5.xml><?xml version="1.0" encoding="utf-8"?>
+<p:sld xmlns:a="http://schemas.openxmlformats.org/drawingml/2006/main" xmlns:r="http://schemas.openxmlformats.org/officeDocument/2006/relationships" xmlns:p="http://schemas.openxmlformats.org/presentationml/2006/main">
+  <p:cSld>
+    <p:spTree>
+      <p:nvGrpSpPr>
+        <p:cNvPr id="1" name=""/>
+        <p:cNvGrpSpPr/>
+        <p:nvPr/>
+      </p:nvGrpSpPr>
+      <p:grpSpPr>
+        <a:xfrm>
+          <a:off x="0" y="0"/>
+          <a:ext cx="0" cy="0"/>
+          <a:chOff x="0" y="0"/>
+          <a:chExt cx="0" cy="0"/>
+        </a:xfrm>
+      </p:grpSpPr>
+      <p:sp>
+        <p:nvSpPr>
+          <p:cNvPr id="2" name="Título 1"/>
+          <p:cNvSpPr>
+            <a:spLocks noGrp="1"/>
+          </p:cNvSpPr>
+          <p:nvPr>
+            <p:ph type="title"/>
+          </p:nvPr>
+        </p:nvSpPr>
+        <p:spPr/>
+        <p:txBody>
+          <a:bodyPr/>
+          <a:lstStyle/>
+          <a:p>
+            <a:r>
+              <a:rPr lang="pt-PT" dirty="0" smtClean="0"/>
+              <a:t>Esquema Lógico </a:t>
+            </a:r>
+            <a:endParaRPr lang="pt-PT" dirty="0"/>
+          </a:p>
+        </p:txBody>
+      </p:sp>
+      <p:pic>
+        <p:nvPicPr>
+          <p:cNvPr id="4" name="Marcador de Posição de Conteúdo 3"/>
+          <p:cNvPicPr>
+            <a:picLocks noGrp="1" noChangeAspect="1"/>
+          </p:cNvPicPr>
+          <p:nvPr>
+            <p:ph idx="1"/>
+          </p:nvPr>
+        </p:nvPicPr>
+        <p:blipFill>
+          <a:blip r:embed="rId2">
+            <a:extLst>
+              <a:ext uri="{28A0092B-C50C-407E-A947-70E740481C1C}">
+                <a14:useLocalDpi xmlns:a14="http://schemas.microsoft.com/office/drawing/2010/main" val="0"/>
+              </a:ext>
+            </a:extLst>
+          </a:blip>
+          <a:stretch>
+            <a:fillRect/>
+          </a:stretch>
+        </p:blipFill>
+        <p:spPr>
+          <a:xfrm>
+            <a:off x="6937917" y="1690688"/>
+            <a:ext cx="5140711" cy="4351338"/>
+          </a:xfrm>
+        </p:spPr>
+      </p:pic>
+      <p:sp>
+        <p:nvSpPr>
+          <p:cNvPr id="5" name="CaixaDeTexto 4"/>
+          <p:cNvSpPr txBox="1"/>
+          <p:nvPr/>
+        </p:nvSpPr>
+        <p:spPr>
+          <a:xfrm>
+            <a:off x="468351" y="1895708"/>
+            <a:ext cx="5787482" cy="1754326"/>
+          </a:xfrm>
+          <a:prstGeom prst="rect">
+            <a:avLst/>
+          </a:prstGeom>
+          <a:noFill/>
+        </p:spPr>
+        <p:txBody>
+          <a:bodyPr wrap="square" rtlCol="0">
+            <a:spAutoFit/>
+          </a:bodyPr>
+          <a:lstStyle/>
+          <a:p>
+            <a:pPr marL="285750" indent="-285750">
+              <a:buFont typeface="Arial" panose="020B0604020202020204" pitchFamily="34" charset="0"/>
+              <a:buChar char="•"/>
+            </a:pPr>
+            <a:r>
+              <a:rPr lang="pt-PT" dirty="0" smtClean="0"/>
+              <a:t>Construção e validação do modelo de dados lógico</a:t>
+            </a:r>
+          </a:p>
+          <a:p>
+            <a:pPr marL="285750" indent="-285750">
+              <a:buFont typeface="Arial" panose="020B0604020202020204" pitchFamily="34" charset="0"/>
+              <a:buChar char="•"/>
+            </a:pPr>
+            <a:r>
+              <a:rPr lang="pt-PT" dirty="0" smtClean="0"/>
+              <a:t>Desenho do modelo lógico</a:t>
+            </a:r>
+          </a:p>
+          <a:p>
+            <a:pPr marL="285750" indent="-285750">
+              <a:buFont typeface="Arial" panose="020B0604020202020204" pitchFamily="34" charset="0"/>
+              <a:buChar char="•"/>
+            </a:pPr>
+            <a:r>
+              <a:rPr lang="pt-PT" dirty="0" smtClean="0"/>
+              <a:t>Validação do modelo através da normalização</a:t>
+            </a:r>
+          </a:p>
+          <a:p>
+            <a:pPr marL="285750" indent="-285750">
+              <a:buFont typeface="Arial" panose="020B0604020202020204" pitchFamily="34" charset="0"/>
+              <a:buChar char="•"/>
+            </a:pPr>
+            <a:r>
+              <a:rPr lang="pt-PT" dirty="0" smtClean="0"/>
+              <a:t>Validação do modelo com interrogações do utilizador</a:t>
+            </a:r>
+          </a:p>
+          <a:p>
+            <a:pPr marL="285750" indent="-285750">
+              <a:buFont typeface="Arial" panose="020B0604020202020204" pitchFamily="34" charset="0"/>
+              <a:buChar char="•"/>
+            </a:pPr>
+            <a:r>
+              <a:rPr lang="pt-PT" dirty="0" smtClean="0"/>
+              <a:t>Validação do modelo com transações estabelecidas</a:t>
+            </a:r>
+          </a:p>
+          <a:p>
+            <a:pPr marL="285750" indent="-285750">
+              <a:buFont typeface="Arial" panose="020B0604020202020204" pitchFamily="34" charset="0"/>
+              <a:buChar char="•"/>
+            </a:pPr>
+            <a:r>
+              <a:rPr lang="pt-PT" dirty="0" smtClean="0"/>
+              <a:t>Revisão do modelo lógico com o utilizador</a:t>
+            </a:r>
+            <a:endParaRPr lang="pt-PT" dirty="0"/>
+          </a:p>
+        </p:txBody>
+      </p:sp>
+    </p:spTree>
+    <p:extLst>
+      <p:ext uri="{BB962C8B-B14F-4D97-AF65-F5344CB8AC3E}">
+        <p14:creationId xmlns:p14="http://schemas.microsoft.com/office/powerpoint/2010/main" val="2048077284"/>
+      </p:ext>
+    </p:extLst>
+  </p:cSld>
+  <p:clrMapOvr>
+    <a:masterClrMapping/>
+  </p:clrMapOvr>
+</p:sld>
+</file>
+
+<file path=ppt/slides/slide6.xml><?xml version="1.0" encoding="utf-8"?>
+<p:sld xmlns:a="http://schemas.openxmlformats.org/drawingml/2006/main" xmlns:r="http://schemas.openxmlformats.org/officeDocument/2006/relationships" xmlns:p="http://schemas.openxmlformats.org/presentationml/2006/main">
+  <p:cSld>
+    <p:spTree>
+      <p:nvGrpSpPr>
+        <p:cNvPr id="1" name=""/>
+        <p:cNvGrpSpPr/>
+        <p:nvPr/>
+      </p:nvGrpSpPr>
+      <p:grpSpPr>
+        <a:xfrm>
+          <a:off x="0" y="0"/>
+          <a:ext cx="0" cy="0"/>
+          <a:chOff x="0" y="0"/>
+          <a:chExt cx="0" cy="0"/>
+        </a:xfrm>
+      </p:grpSpPr>
+      <p:sp>
+        <p:nvSpPr>
+          <p:cNvPr id="2" name="Título 1"/>
+          <p:cNvSpPr>
+            <a:spLocks noGrp="1"/>
+          </p:cNvSpPr>
+          <p:nvPr>
+            <p:ph type="title"/>
+          </p:nvPr>
+        </p:nvSpPr>
+        <p:spPr>
+          <a:xfrm>
+            <a:off x="838200" y="275916"/>
+            <a:ext cx="10515600" cy="1325563"/>
+          </a:xfrm>
+        </p:spPr>
+        <p:txBody>
+          <a:bodyPr/>
+          <a:lstStyle/>
+          <a:p>
+            <a:r>
+              <a:rPr lang="pt-PT" dirty="0" smtClean="0"/>
+              <a:t>Esquema Físico</a:t>
+            </a:r>
+            <a:endParaRPr lang="pt-PT" dirty="0"/>
+          </a:p>
+        </p:txBody>
+      </p:sp>
+      <p:sp>
+        <p:nvSpPr>
+          <p:cNvPr id="3" name="Marcador de Posição de Conteúdo 2"/>
+          <p:cNvSpPr>
+            <a:spLocks noGrp="1"/>
+          </p:cNvSpPr>
+          <p:nvPr>
+            <p:ph idx="1"/>
+          </p:nvPr>
+        </p:nvSpPr>
+        <p:spPr>
+          <a:xfrm>
+            <a:off x="838200" y="1654059"/>
+            <a:ext cx="5216912" cy="4720141"/>
+          </a:xfrm>
+        </p:spPr>
+        <p:txBody>
+          <a:bodyPr>
+            <a:normAutofit/>
+          </a:bodyPr>
+          <a:lstStyle/>
+          <a:p>
+            <a:r>
+              <a:rPr lang="pt-PT" sz="1800" dirty="0" smtClean="0"/>
+              <a:t>Seleção do sistema de gestão de bases de dados</a:t>
+            </a:r>
+          </a:p>
+          <a:p>
+            <a:r>
+              <a:rPr lang="pt-PT" sz="1800" dirty="0" smtClean="0"/>
+              <a:t>Tradução do esquema lógico para o sistema de gestão de bases de dados escolhido em SQL</a:t>
+            </a:r>
+          </a:p>
+          <a:p>
+            <a:r>
+              <a:rPr lang="pt-PT" sz="1800" dirty="0"/>
+              <a:t>Tradução das interrogações do utilizador para </a:t>
+            </a:r>
+            <a:r>
+              <a:rPr lang="pt-PT" sz="1800" dirty="0" smtClean="0"/>
+              <a:t>SQL</a:t>
+            </a:r>
+          </a:p>
+          <a:p>
+            <a:r>
+              <a:rPr lang="pt-PT" sz="1800" dirty="0"/>
+              <a:t>Tradução das transações estabelecidas para </a:t>
+            </a:r>
+            <a:r>
+              <a:rPr lang="pt-PT" sz="1800" dirty="0" smtClean="0"/>
+              <a:t>SQL</a:t>
+            </a:r>
+          </a:p>
+          <a:p>
+            <a:r>
+              <a:rPr lang="pt-PT" sz="1800" dirty="0"/>
+              <a:t>Escolha, definição e caracterização de índices em </a:t>
+            </a:r>
+            <a:r>
+              <a:rPr lang="pt-PT" sz="1800" dirty="0" smtClean="0"/>
+              <a:t>SQL</a:t>
+            </a:r>
+          </a:p>
+          <a:p>
+            <a:r>
+              <a:rPr lang="pt-PT" sz="1800" dirty="0"/>
+              <a:t>Estimativa do espaço em disco da base de dados e taxa de crescimento </a:t>
+            </a:r>
+            <a:r>
+              <a:rPr lang="pt-PT" sz="1800" dirty="0" smtClean="0"/>
+              <a:t>anual</a:t>
+            </a:r>
+          </a:p>
+          <a:p>
+            <a:r>
+              <a:rPr lang="pt-PT" sz="1800" dirty="0"/>
+              <a:t>Definição e caracterização das vistas de utilização em </a:t>
+            </a:r>
+            <a:r>
+              <a:rPr lang="pt-PT" sz="1800" dirty="0" smtClean="0"/>
+              <a:t>SQL</a:t>
+            </a:r>
+          </a:p>
+          <a:p>
+            <a:r>
+              <a:rPr lang="pt-PT" sz="1800" dirty="0"/>
+              <a:t>Definição e caracterização dos mecanismos de segurança em </a:t>
+            </a:r>
+            <a:r>
+              <a:rPr lang="pt-PT" sz="1800" dirty="0" smtClean="0"/>
+              <a:t>SQL</a:t>
+            </a:r>
+          </a:p>
+          <a:p>
+            <a:r>
+              <a:rPr lang="pt-PT" sz="1800" dirty="0"/>
+              <a:t>Revisão do sistema implementado com o utilizador</a:t>
+            </a:r>
+            <a:endParaRPr lang="pt-PT" sz="1800" dirty="0"/>
+          </a:p>
+        </p:txBody>
+      </p:sp>
+      <p:pic>
+        <p:nvPicPr>
+          <p:cNvPr id="1026" name="Picture 2" descr="Transação"/>
+          <p:cNvPicPr>
+            <a:picLocks noChangeAspect="1" noChangeArrowheads="1"/>
+          </p:cNvPicPr>
+          <p:nvPr/>
+        </p:nvPicPr>
+        <p:blipFill>
+          <a:blip r:embed="rId2">
+            <a:extLst>
+              <a:ext uri="{28A0092B-C50C-407E-A947-70E740481C1C}">
+                <a14:useLocalDpi xmlns:a14="http://schemas.microsoft.com/office/drawing/2010/main" val="0"/>
+              </a:ext>
+            </a:extLst>
+          </a:blip>
+          <a:srcRect/>
+          <a:stretch>
+            <a:fillRect/>
+          </a:stretch>
+        </p:blipFill>
+        <p:spPr bwMode="auto">
+          <a:xfrm>
+            <a:off x="6055112" y="954708"/>
+            <a:ext cx="5343525" cy="1524000"/>
+          </a:xfrm>
+          <a:prstGeom prst="rect">
+            <a:avLst/>
+          </a:prstGeom>
+          <a:noFill/>
+          <a:ln>
+            <a:noFill/>
+          </a:ln>
+          <a:extLst>
+            <a:ext uri="{909E8E84-426E-40DD-AFC4-6F175D3DCCD1}">
+              <a14:hiddenFill xmlns:a14="http://schemas.microsoft.com/office/drawing/2010/main">
+                <a:solidFill>
+                  <a:srgbClr val="FFFFFF"/>
+                </a:solidFill>
+              </a14:hiddenFill>
+            </a:ext>
+            <a:ext uri="{91240B29-F687-4F45-9708-019B960494DF}">
+              <a14:hiddenLine xmlns:a14="http://schemas.microsoft.com/office/drawing/2010/main" w="9525">
+                <a:solidFill>
+                  <a:srgbClr val="000000"/>
+                </a:solidFill>
+                <a:miter lim="800000"/>
+                <a:headEnd/>
+                <a:tailEnd/>
+              </a14:hiddenLine>
+            </a:ext>
+          </a:extLst>
+        </p:spPr>
+      </p:pic>
+      <p:pic>
+        <p:nvPicPr>
+          <p:cNvPr id="5" name="Imagem 4"/>
+          <p:cNvPicPr/>
+          <p:nvPr/>
+        </p:nvPicPr>
+        <p:blipFill>
+          <a:blip r:embed="rId3">
+            <a:extLst>
+              <a:ext uri="{28A0092B-C50C-407E-A947-70E740481C1C}">
+                <a14:useLocalDpi xmlns:a14="http://schemas.microsoft.com/office/drawing/2010/main" val="0"/>
+              </a:ext>
+            </a:extLst>
+          </a:blip>
+          <a:stretch>
+            <a:fillRect/>
+          </a:stretch>
+        </p:blipFill>
+        <p:spPr>
+          <a:xfrm>
+            <a:off x="6055112" y="2478708"/>
+            <a:ext cx="5612130" cy="2437765"/>
+          </a:xfrm>
+          <a:prstGeom prst="rect">
+            <a:avLst/>
+          </a:prstGeom>
+        </p:spPr>
+      </p:pic>
+      <p:pic>
+        <p:nvPicPr>
+          <p:cNvPr id="6" name="Imagem 5"/>
+          <p:cNvPicPr/>
+          <p:nvPr/>
+        </p:nvPicPr>
+        <p:blipFill>
+          <a:blip r:embed="rId4">
+            <a:extLst>
+              <a:ext uri="{28A0092B-C50C-407E-A947-70E740481C1C}">
+                <a14:useLocalDpi xmlns:a14="http://schemas.microsoft.com/office/drawing/2010/main" val="0"/>
+              </a:ext>
+            </a:extLst>
+          </a:blip>
+          <a:stretch>
+            <a:fillRect/>
+          </a:stretch>
+        </p:blipFill>
+        <p:spPr>
+          <a:xfrm>
+            <a:off x="6055112" y="4916473"/>
+            <a:ext cx="3971925" cy="923925"/>
+          </a:xfrm>
+          <a:prstGeom prst="rect">
+            <a:avLst/>
+          </a:prstGeom>
+        </p:spPr>
+      </p:pic>
+    </p:spTree>
+    <p:extLst>
+      <p:ext uri="{BB962C8B-B14F-4D97-AF65-F5344CB8AC3E}">
+        <p14:creationId xmlns:p14="http://schemas.microsoft.com/office/powerpoint/2010/main" val="1546348636"/>
+      </p:ext>
+    </p:extLst>
+  </p:cSld>
+  <p:clrMapOvr>
+    <a:masterClrMapping/>
+  </p:clrMapOvr>
+</p:sld>
+</file>
+
+<file path=ppt/slides/slide7.xml><?xml version="1.0" encoding="utf-8"?>
+<p:sld xmlns:a="http://schemas.openxmlformats.org/drawingml/2006/main" xmlns:r="http://schemas.openxmlformats.org/officeDocument/2006/relationships" xmlns:p="http://schemas.openxmlformats.org/presentationml/2006/main">
+  <p:cSld>
+    <p:spTree>
+      <p:nvGrpSpPr>
+        <p:cNvPr id="1" name=""/>
+        <p:cNvGrpSpPr/>
+        <p:nvPr/>
+      </p:nvGrpSpPr>
+      <p:grpSpPr>
+        <a:xfrm>
+          <a:off x="0" y="0"/>
+          <a:ext cx="0" cy="0"/>
+          <a:chOff x="0" y="0"/>
+          <a:chExt cx="0" cy="0"/>
+        </a:xfrm>
+      </p:grpSpPr>
+      <p:sp>
+        <p:nvSpPr>
+          <p:cNvPr id="2" name="Título 1"/>
+          <p:cNvSpPr>
+            <a:spLocks noGrp="1"/>
+          </p:cNvSpPr>
+          <p:nvPr>
+            <p:ph type="title"/>
+          </p:nvPr>
+        </p:nvSpPr>
+        <p:spPr/>
+        <p:txBody>
+          <a:bodyPr/>
+          <a:lstStyle/>
+          <a:p>
+            <a:r>
+              <a:rPr lang="pt-PT" dirty="0" smtClean="0"/>
+              <a:t>Migração</a:t>
+            </a:r>
+            <a:endParaRPr lang="pt-PT" dirty="0"/>
+          </a:p>
+        </p:txBody>
+      </p:sp>
+      <p:sp>
+        <p:nvSpPr>
+          <p:cNvPr id="3" name="Marcador de Posição de Conteúdo 2"/>
+          <p:cNvSpPr>
+            <a:spLocks noGrp="1"/>
+          </p:cNvSpPr>
+          <p:nvPr>
+            <p:ph idx="1"/>
+          </p:nvPr>
+        </p:nvSpPr>
+        <p:spPr/>
+        <p:txBody>
+          <a:bodyPr/>
+          <a:lstStyle/>
+          <a:p>
+            <a:endParaRPr lang="pt-PT"/>
+          </a:p>
+        </p:txBody>
+      </p:sp>
+    </p:spTree>
+    <p:extLst>
+      <p:ext uri="{BB962C8B-B14F-4D97-AF65-F5344CB8AC3E}">
+        <p14:creationId xmlns:p14="http://schemas.microsoft.com/office/powerpoint/2010/main" val="1941666973"/>
+      </p:ext>
+    </p:extLst>
+  </p:cSld>
+  <p:clrMapOvr>
+    <a:masterClrMapping/>
+  </p:clrMapOvr>
+</p:sld>
+</file>
+
+<file path=ppt/slides/slide8.xml><?xml version="1.0" encoding="utf-8"?>
+<p:sld xmlns:a="http://schemas.openxmlformats.org/drawingml/2006/main" xmlns:r="http://schemas.openxmlformats.org/officeDocument/2006/relationships" xmlns:p="http://schemas.openxmlformats.org/presentationml/2006/main">
+  <p:cSld>
+    <p:spTree>
+      <p:nvGrpSpPr>
+        <p:cNvPr id="1" name=""/>
+        <p:cNvGrpSpPr/>
+        <p:nvPr/>
+      </p:nvGrpSpPr>
+      <p:grpSpPr>
+        <a:xfrm>
+          <a:off x="0" y="0"/>
+          <a:ext cx="0" cy="0"/>
+          <a:chOff x="0" y="0"/>
+          <a:chExt cx="0" cy="0"/>
+        </a:xfrm>
+      </p:grpSpPr>
+      <p:sp>
+        <p:nvSpPr>
+          <p:cNvPr id="2" name="Título 1"/>
+          <p:cNvSpPr>
+            <a:spLocks noGrp="1"/>
+          </p:cNvSpPr>
+          <p:nvPr>
+            <p:ph type="title"/>
+          </p:nvPr>
+        </p:nvSpPr>
+        <p:spPr/>
+        <p:txBody>
+          <a:bodyPr/>
+          <a:lstStyle/>
+          <a:p>
+            <a:r>
+              <a:rPr lang="pt-PT" dirty="0" smtClean="0"/>
+              <a:t>Conclusão</a:t>
+            </a:r>
+            <a:endParaRPr lang="pt-PT" dirty="0"/>
+          </a:p>
+        </p:txBody>
+      </p:sp>
+      <p:sp>
+        <p:nvSpPr>
+          <p:cNvPr id="3" name="Marcador de Posição de Conteúdo 2"/>
+          <p:cNvSpPr>
+            <a:spLocks noGrp="1"/>
+          </p:cNvSpPr>
+          <p:nvPr>
+            <p:ph idx="1"/>
+          </p:nvPr>
+        </p:nvSpPr>
+        <p:spPr/>
+        <p:txBody>
+          <a:bodyPr/>
+          <a:lstStyle/>
+          <a:p>
+            <a:endParaRPr lang="pt-PT"/>
+          </a:p>
+        </p:txBody>
+      </p:sp>
+    </p:spTree>
+    <p:extLst>
+      <p:ext uri="{BB962C8B-B14F-4D97-AF65-F5344CB8AC3E}">
+        <p14:creationId xmlns:p14="http://schemas.microsoft.com/office/powerpoint/2010/main" val="1061714035"/>
+      </p:ext>
+    </p:extLst>
+  </p:cSld>
+  <p:clrMapOvr>
+    <a:masterClrMapping/>
+  </p:clrMapOvr>
 </p:sld>
 </file>
 

</xml_diff>

<commit_message>
Corrigi umas coisas no ppt e no guião
</commit_message>
<xml_diff>
--- a/Apresentação BD.pptx
+++ b/Apresentação BD.pptx
@@ -3614,9 +3614,16 @@
             <p:ph idx="1"/>
           </p:nvPr>
         </p:nvSpPr>
-        <p:spPr/>
-        <p:txBody>
-          <a:bodyPr/>
+        <p:spPr>
+          <a:xfrm>
+            <a:off x="838200" y="1516566"/>
+            <a:ext cx="10515600" cy="5062654"/>
+          </a:xfrm>
+        </p:spPr>
+        <p:txBody>
+          <a:bodyPr>
+            <a:normAutofit fontScale="92500" lnSpcReduction="10000"/>
+          </a:bodyPr>
           <a:lstStyle/>
           <a:p>
             <a:r>
@@ -3636,57 +3643,172 @@
           <a:p>
             <a:r>
               <a:rPr lang="pt-PT" dirty="0"/>
-              <a:t>Requisitos Levantados</a:t>
+              <a:t>Requisitos </a:t>
+            </a:r>
+            <a:r>
+              <a:rPr lang="pt-PT" dirty="0" smtClean="0"/>
+              <a:t>Levantados</a:t>
+            </a:r>
+          </a:p>
+          <a:p>
+            <a:pPr marL="0" indent="0">
+              <a:buNone/>
+            </a:pPr>
+            <a:r>
+              <a:rPr lang="pt-PT" sz="1800" b="1" dirty="0" smtClean="0"/>
+              <a:t>	Requisitos </a:t>
+            </a:r>
+            <a:r>
+              <a:rPr lang="pt-PT" sz="1800" b="1" dirty="0"/>
+              <a:t>do utilizador:</a:t>
             </a:r>
             <a:endParaRPr lang="pt-PT" sz="1800" dirty="0"/>
           </a:p>
           <a:p>
-            <a:pPr lvl="1"/>
-            <a:r>
-              <a:rPr lang="pt-PT" dirty="0"/>
-              <a:t>Requisitos de Descrição</a:t>
-            </a:r>
-          </a:p>
-          <a:p>
-            <a:pPr marL="457200" lvl="1" indent="0">
+            <a:pPr marL="0" indent="0">
               <a:buNone/>
             </a:pPr>
             <a:r>
               <a:rPr lang="pt-PT" sz="1800" dirty="0"/>
-              <a:t>Caraterísticas de cada entidade</a:t>
-            </a:r>
-          </a:p>
-          <a:p>
-            <a:pPr lvl="1"/>
-            <a:r>
-              <a:rPr lang="pt-PT" dirty="0"/>
-              <a:t>Requisitos de exploração</a:t>
-            </a:r>
-          </a:p>
-          <a:p>
-            <a:pPr marL="457200" lvl="1" indent="0">
+              <a:t>	</a:t>
+            </a:r>
+            <a:r>
+              <a:rPr lang="pt-PT" sz="1800" dirty="0" smtClean="0"/>
+              <a:t>Ver </a:t>
+            </a:r>
+            <a:r>
+              <a:rPr lang="pt-PT" sz="1800" dirty="0"/>
+              <a:t>produtos que estão disponíveis no mercado; </a:t>
+            </a:r>
+          </a:p>
+          <a:p>
+            <a:pPr marL="0" indent="0">
               <a:buNone/>
             </a:pPr>
             <a:r>
+              <a:rPr lang="pt-PT" sz="1800" dirty="0" smtClean="0"/>
+              <a:t>	Filtrar </a:t>
+            </a:r>
+            <a:r>
               <a:rPr lang="pt-PT" sz="1800" dirty="0"/>
-              <a:t>Permissão de cada utilizador para pesquisar no sistema</a:t>
-            </a:r>
-          </a:p>
-          <a:p>
-            <a:pPr lvl="1"/>
-            <a:r>
-              <a:rPr lang="pt-PT" dirty="0"/>
-              <a:t>Requisitos de Controlo</a:t>
-            </a:r>
-          </a:p>
-          <a:p>
-            <a:pPr marL="457200" lvl="1" indent="0">
+              <a:t>os produtos que pretende ver/comprar do mercado; </a:t>
+            </a:r>
+          </a:p>
+          <a:p>
+            <a:pPr marL="0" indent="0">
               <a:buNone/>
             </a:pPr>
             <a:r>
+              <a:rPr lang="pt-PT" sz="1800" dirty="0" smtClean="0"/>
+              <a:t>	Aceder </a:t>
+            </a:r>
+            <a:r>
               <a:rPr lang="pt-PT" sz="1800" dirty="0"/>
-              <a:t>Permissão de cada utilizador para editar informação da base de dados</a:t>
-            </a:r>
+              <a:t>a informações pessoais; </a:t>
+            </a:r>
+          </a:p>
+          <a:p>
+            <a:pPr marL="0" indent="0">
+              <a:buNone/>
+            </a:pPr>
+            <a:r>
+              <a:rPr lang="pt-PT" sz="1800" dirty="0"/>
+              <a:t>	</a:t>
+            </a:r>
+            <a:r>
+              <a:rPr lang="pt-PT" sz="1800" dirty="0" smtClean="0"/>
+              <a:t>Comprar </a:t>
+            </a:r>
+            <a:r>
+              <a:rPr lang="pt-PT" sz="1800" dirty="0"/>
+              <a:t>produtos que estão disponíveis no mercado;</a:t>
+            </a:r>
+          </a:p>
+          <a:p>
+            <a:pPr marL="0" indent="0">
+              <a:buNone/>
+            </a:pPr>
+            <a:r>
+              <a:rPr lang="pt-PT" sz="1800" dirty="0"/>
+              <a:t>	</a:t>
+            </a:r>
+            <a:r>
+              <a:rPr lang="pt-PT" sz="1800" dirty="0" smtClean="0"/>
+              <a:t>Adicionar/Alterar </a:t>
+            </a:r>
+            <a:r>
+              <a:rPr lang="pt-PT" sz="1800" dirty="0"/>
+              <a:t>informações pessoais</a:t>
+            </a:r>
+            <a:r>
+              <a:rPr lang="pt-PT" sz="1800" dirty="0" smtClean="0"/>
+              <a:t>;</a:t>
+            </a:r>
+            <a:endParaRPr lang="pt-PT" sz="1800" dirty="0"/>
+          </a:p>
+          <a:p>
+            <a:pPr marL="0" indent="0">
+              <a:buNone/>
+            </a:pPr>
+            <a:r>
+              <a:rPr lang="pt-PT" sz="1800" b="1" dirty="0" smtClean="0"/>
+              <a:t>	Requisitos </a:t>
+            </a:r>
+            <a:r>
+              <a:rPr lang="pt-PT" sz="1800" b="1" dirty="0"/>
+              <a:t>do </a:t>
+            </a:r>
+            <a:r>
+              <a:rPr lang="pt-PT" sz="1800" b="1" dirty="0" smtClean="0"/>
+              <a:t>administrador:</a:t>
+            </a:r>
+            <a:endParaRPr lang="pt-PT" sz="1800" dirty="0"/>
+          </a:p>
+          <a:p>
+            <a:pPr marL="0" indent="0">
+              <a:buNone/>
+            </a:pPr>
+            <a:r>
+              <a:rPr lang="pt-PT" sz="1800" dirty="0" smtClean="0"/>
+              <a:t>	Aceder </a:t>
+            </a:r>
+            <a:r>
+              <a:rPr lang="pt-PT" sz="1800" dirty="0"/>
+              <a:t>a informações de todo o sistema; </a:t>
+            </a:r>
+          </a:p>
+          <a:p>
+            <a:pPr marL="0" indent="0">
+              <a:buNone/>
+            </a:pPr>
+            <a:r>
+              <a:rPr lang="pt-PT" sz="1800" dirty="0"/>
+              <a:t>	</a:t>
+            </a:r>
+            <a:r>
+              <a:rPr lang="pt-PT" sz="1800" dirty="0" smtClean="0"/>
+              <a:t>Ver </a:t>
+            </a:r>
+            <a:r>
+              <a:rPr lang="pt-PT" sz="1800" dirty="0"/>
+              <a:t>estatísticas do mercado e dos utilizadores;</a:t>
+            </a:r>
+          </a:p>
+          <a:p>
+            <a:pPr marL="0" indent="0">
+              <a:buNone/>
+            </a:pPr>
+            <a:r>
+              <a:rPr lang="pt-PT" sz="1800" dirty="0" smtClean="0"/>
+              <a:t>	Adicionar/Remover </a:t>
+            </a:r>
+            <a:r>
+              <a:rPr lang="pt-PT" sz="1800" dirty="0"/>
+              <a:t>métodos de pagamento ou transporte; </a:t>
+            </a:r>
+          </a:p>
+          <a:p>
+            <a:endParaRPr lang="pt-PT" sz="1800" dirty="0"/>
           </a:p>
         </p:txBody>
       </p:sp>
@@ -4141,13 +4263,8 @@
           <a:p>
             <a:r>
               <a:rPr lang="pt-PT" sz="1800" dirty="0"/>
-              <a:t>Definição e caracterização dos mecanismos de segurança </a:t>
-            </a:r>
-            <a:r>
-              <a:rPr lang="pt-PT" sz="1800"/>
-              <a:t>em SQL</a:t>
-            </a:r>
-            <a:endParaRPr lang="pt-PT" sz="1800" dirty="0"/>
+              <a:t>Definição e caracterização dos mecanismos de segurança em SQL</a:t>
+            </a:r>
           </a:p>
         </p:txBody>
       </p:sp>
@@ -4156,7 +4273,7 @@
           <p:cNvPr id="7" name="Imagem 6">
             <a:extLst>
               <a:ext uri="{FF2B5EF4-FFF2-40B4-BE49-F238E27FC236}">
-                <a16:creationId xmlns:a16="http://schemas.microsoft.com/office/drawing/2014/main" id="{2B0F89FA-6832-449D-A692-D35A680C5A5F}"/>
+                <a16:creationId xmlns:a16="http://schemas.microsoft.com/office/drawing/2014/main" xmlns="" id="{2B0F89FA-6832-449D-A692-D35A680C5A5F}"/>
               </a:ext>
             </a:extLst>
           </p:cNvPr>
@@ -4181,6 +4298,66 @@
           <a:xfrm>
             <a:off x="6136890" y="804496"/>
             <a:ext cx="4953691" cy="5249008"/>
+          </a:xfrm>
+          <a:prstGeom prst="rect">
+            <a:avLst/>
+          </a:prstGeom>
+        </p:spPr>
+      </p:pic>
+      <p:pic>
+        <p:nvPicPr>
+          <p:cNvPr id="4" name="Imagem 3"/>
+          <p:cNvPicPr>
+            <a:picLocks noChangeAspect="1"/>
+          </p:cNvPicPr>
+          <p:nvPr/>
+        </p:nvPicPr>
+        <p:blipFill>
+          <a:blip r:embed="rId3">
+            <a:extLst>
+              <a:ext uri="{28A0092B-C50C-407E-A947-70E740481C1C}">
+                <a14:useLocalDpi xmlns:a14="http://schemas.microsoft.com/office/drawing/2010/main" val="0"/>
+              </a:ext>
+            </a:extLst>
+          </a:blip>
+          <a:stretch>
+            <a:fillRect/>
+          </a:stretch>
+        </p:blipFill>
+        <p:spPr>
+          <a:xfrm>
+            <a:off x="1632602" y="4285286"/>
+            <a:ext cx="3181794" cy="495369"/>
+          </a:xfrm>
+          <a:prstGeom prst="rect">
+            <a:avLst/>
+          </a:prstGeom>
+        </p:spPr>
+      </p:pic>
+      <p:pic>
+        <p:nvPicPr>
+          <p:cNvPr id="5" name="Imagem 4"/>
+          <p:cNvPicPr>
+            <a:picLocks noChangeAspect="1"/>
+          </p:cNvPicPr>
+          <p:nvPr/>
+        </p:nvPicPr>
+        <p:blipFill>
+          <a:blip r:embed="rId4">
+            <a:extLst>
+              <a:ext uri="{28A0092B-C50C-407E-A947-70E740481C1C}">
+                <a14:useLocalDpi xmlns:a14="http://schemas.microsoft.com/office/drawing/2010/main" val="0"/>
+              </a:ext>
+            </a:extLst>
+          </a:blip>
+          <a:stretch>
+            <a:fillRect/>
+          </a:stretch>
+        </p:blipFill>
+        <p:spPr>
+          <a:xfrm>
+            <a:off x="540015" y="5091117"/>
+            <a:ext cx="5068007" cy="990738"/>
           </a:xfrm>
           <a:prstGeom prst="rect">
             <a:avLst/>
@@ -4249,12 +4426,137 @@
             <p:ph idx="1"/>
           </p:nvPr>
         </p:nvSpPr>
-        <p:spPr/>
-        <p:txBody>
-          <a:bodyPr/>
-          <a:lstStyle/>
-          <a:p>
-            <a:endParaRPr lang="pt-PT"/>
+        <p:spPr>
+          <a:xfrm>
+            <a:off x="838200" y="1690688"/>
+            <a:ext cx="10515600" cy="4620902"/>
+          </a:xfrm>
+        </p:spPr>
+        <p:txBody>
+          <a:bodyPr>
+            <a:normAutofit fontScale="92500" lnSpcReduction="10000"/>
+          </a:bodyPr>
+          <a:lstStyle/>
+          <a:p>
+            <a:r>
+              <a:rPr lang="pt-PT" sz="3000" b="1" dirty="0"/>
+              <a:t>Justificação da Migração</a:t>
+            </a:r>
+            <a:endParaRPr lang="pt-PT" sz="3000" dirty="0"/>
+          </a:p>
+          <a:p>
+            <a:r>
+              <a:rPr lang="pt-PT" sz="3000" b="1" dirty="0"/>
+              <a:t>Estrutura base do sistema </a:t>
+            </a:r>
+            <a:r>
+              <a:rPr lang="pt-PT" sz="3000" b="1" dirty="0" err="1" smtClean="0"/>
+              <a:t>NoSQL</a:t>
+            </a:r>
+            <a:endParaRPr lang="pt-PT" sz="3000" b="1" dirty="0" smtClean="0"/>
+          </a:p>
+          <a:p>
+            <a:pPr lvl="1"/>
+            <a:r>
+              <a:rPr lang="pt-PT" sz="2600" dirty="0" smtClean="0"/>
+              <a:t>Utilizador</a:t>
+            </a:r>
+            <a:r>
+              <a:rPr lang="pt-PT" sz="2600" dirty="0"/>
+              <a:t>;</a:t>
+            </a:r>
+            <a:endParaRPr lang="pt-PT" sz="3500" dirty="0"/>
+          </a:p>
+          <a:p>
+            <a:pPr lvl="1"/>
+            <a:r>
+              <a:rPr lang="pt-PT" sz="2600" dirty="0" smtClean="0"/>
+              <a:t>Produto</a:t>
+            </a:r>
+            <a:r>
+              <a:rPr lang="pt-PT" sz="2600" dirty="0"/>
+              <a:t>;</a:t>
+            </a:r>
+            <a:endParaRPr lang="pt-PT" sz="3500" dirty="0"/>
+          </a:p>
+          <a:p>
+            <a:pPr lvl="1"/>
+            <a:r>
+              <a:rPr lang="pt-PT" sz="2600" dirty="0" smtClean="0"/>
+              <a:t>Compra</a:t>
+            </a:r>
+            <a:r>
+              <a:rPr lang="pt-PT" sz="2600" dirty="0"/>
+              <a:t>;</a:t>
+            </a:r>
+            <a:endParaRPr lang="pt-PT" sz="3500" dirty="0"/>
+          </a:p>
+          <a:p>
+            <a:pPr lvl="1"/>
+            <a:r>
+              <a:rPr lang="pt-PT" sz="2600" dirty="0" smtClean="0"/>
+              <a:t>Carrinho</a:t>
+            </a:r>
+            <a:r>
+              <a:rPr lang="pt-PT" sz="2600" dirty="0"/>
+              <a:t>;</a:t>
+            </a:r>
+            <a:endParaRPr lang="pt-PT" sz="3500" dirty="0"/>
+          </a:p>
+          <a:p>
+            <a:pPr lvl="1"/>
+            <a:r>
+              <a:rPr lang="pt-PT" sz="2600" dirty="0" smtClean="0"/>
+              <a:t>MetodosPagamento</a:t>
+            </a:r>
+            <a:r>
+              <a:rPr lang="pt-PT" sz="2600" dirty="0"/>
+              <a:t>;</a:t>
+            </a:r>
+            <a:endParaRPr lang="pt-PT" sz="3500" dirty="0"/>
+          </a:p>
+          <a:p>
+            <a:pPr lvl="1"/>
+            <a:r>
+              <a:rPr lang="pt-PT" sz="2600" dirty="0" smtClean="0"/>
+              <a:t>Transporte;</a:t>
+            </a:r>
+            <a:endParaRPr lang="pt-PT" sz="2600" dirty="0"/>
+          </a:p>
+          <a:p>
+            <a:r>
+              <a:rPr lang="pt-PT" sz="3000" b="1" dirty="0"/>
+              <a:t>Processo de migração de </a:t>
+            </a:r>
+            <a:r>
+              <a:rPr lang="pt-PT" sz="3000" b="1" dirty="0" smtClean="0"/>
+              <a:t>dados</a:t>
+            </a:r>
+          </a:p>
+          <a:p>
+            <a:pPr lvl="1"/>
+            <a:r>
+              <a:rPr lang="pt-PT" sz="2600" dirty="0" smtClean="0"/>
+              <a:t>Extração</a:t>
+            </a:r>
+          </a:p>
+          <a:p>
+            <a:pPr lvl="1"/>
+            <a:r>
+              <a:rPr lang="pt-PT" sz="2600" dirty="0" smtClean="0"/>
+              <a:t>Transformação</a:t>
+            </a:r>
+          </a:p>
+          <a:p>
+            <a:pPr lvl="1"/>
+            <a:r>
+              <a:rPr lang="pt-PT" sz="2600" dirty="0" smtClean="0"/>
+              <a:t>Carregamento</a:t>
+            </a:r>
+            <a:endParaRPr lang="pt-PT" sz="2600" dirty="0"/>
+          </a:p>
+          <a:p>
+            <a:endParaRPr lang="pt-PT" dirty="0"/>
           </a:p>
         </p:txBody>
       </p:sp>

</xml_diff>